<commit_message>
Add document, add work, add silde, chỉnh sửa de cuong
</commit_message>
<xml_diff>
--- a/Outline thesis/De cuong/Kientrucdetai_26_8.pptx
+++ b/Outline thesis/De cuong/Kientrucdetai_26_8.pptx
@@ -3248,8 +3248,8 @@
         </p:nvSpPr>
         <p:spPr>
           <a:xfrm>
-            <a:off x="1828800" y="5715000"/>
-            <a:ext cx="5625258" cy="646331"/>
+            <a:off x="2209800" y="5638800"/>
+            <a:ext cx="4806188" cy="646331"/>
           </a:xfrm>
           <a:prstGeom prst="rect">
             <a:avLst/>
@@ -3262,350 +3262,185 @@
           </a:bodyPr>
           <a:lstStyle/>
           <a:p>
-            <a:pPr algn="ctr"/>
-            <a:r>
-              <a:rPr lang="en-US" b="1" dirty="0" err="1" smtClean="0">
-                <a:latin typeface="Times New Roman" pitchFamily="18" charset="0"/>
-                <a:cs typeface="Times New Roman" pitchFamily="18" charset="0"/>
-              </a:rPr>
-              <a:t>Hệ</a:t>
-            </a:r>
-            <a:r>
-              <a:rPr lang="en-US" b="1" dirty="0" smtClean="0">
-                <a:latin typeface="Times New Roman" pitchFamily="18" charset="0"/>
-                <a:cs typeface="Times New Roman" pitchFamily="18" charset="0"/>
-              </a:rPr>
+            <a:r>
+              <a:rPr lang="en-US" b="1" dirty="0" err="1" smtClean="0"/>
+              <a:t>Xây</a:t>
+            </a:r>
+            <a:r>
+              <a:rPr lang="en-US" b="1" dirty="0" smtClean="0"/>
               <a:t> </a:t>
             </a:r>
             <a:r>
-              <a:rPr lang="en-US" b="1" dirty="0" err="1" smtClean="0">
-                <a:latin typeface="Times New Roman" pitchFamily="18" charset="0"/>
-                <a:cs typeface="Times New Roman" pitchFamily="18" charset="0"/>
-              </a:rPr>
-              <a:t>thống</a:t>
-            </a:r>
-            <a:r>
-              <a:rPr lang="en-US" b="1" dirty="0" smtClean="0">
-                <a:latin typeface="Times New Roman" pitchFamily="18" charset="0"/>
-                <a:cs typeface="Times New Roman" pitchFamily="18" charset="0"/>
-              </a:rPr>
+              <a:rPr lang="en-US" b="1" dirty="0" err="1" smtClean="0"/>
+              <a:t>dựng</a:t>
+            </a:r>
+            <a:r>
+              <a:rPr lang="en-US" b="1" dirty="0" smtClean="0"/>
               <a:t> </a:t>
             </a:r>
             <a:r>
-              <a:rPr lang="en-US" b="1" dirty="0" err="1" smtClean="0">
-                <a:latin typeface="Times New Roman" pitchFamily="18" charset="0"/>
-                <a:cs typeface="Times New Roman" pitchFamily="18" charset="0"/>
-              </a:rPr>
-              <a:t>xây</a:t>
-            </a:r>
-            <a:r>
-              <a:rPr lang="en-US" b="1" dirty="0" smtClean="0">
-                <a:latin typeface="Times New Roman" pitchFamily="18" charset="0"/>
-                <a:cs typeface="Times New Roman" pitchFamily="18" charset="0"/>
-              </a:rPr>
+              <a:rPr lang="en-US" b="1" dirty="0" err="1" smtClean="0"/>
+              <a:t>dữ</a:t>
+            </a:r>
+            <a:r>
+              <a:rPr lang="en-US" b="1" dirty="0" smtClean="0"/>
               <a:t> </a:t>
             </a:r>
             <a:r>
-              <a:rPr lang="en-US" b="1" dirty="0" err="1" smtClean="0">
-                <a:latin typeface="Times New Roman" pitchFamily="18" charset="0"/>
-                <a:cs typeface="Times New Roman" pitchFamily="18" charset="0"/>
-              </a:rPr>
-              <a:t>dựng</a:t>
-            </a:r>
-            <a:r>
-              <a:rPr lang="en-US" b="1" dirty="0" smtClean="0">
-                <a:latin typeface="Times New Roman" pitchFamily="18" charset="0"/>
-                <a:cs typeface="Times New Roman" pitchFamily="18" charset="0"/>
-              </a:rPr>
+              <a:rPr lang="en-US" b="1" dirty="0" err="1" smtClean="0"/>
+              <a:t>liệu</a:t>
+            </a:r>
+            <a:r>
+              <a:rPr lang="en-US" b="1" dirty="0" smtClean="0"/>
               <a:t> </a:t>
             </a:r>
             <a:r>
-              <a:rPr lang="en-US" b="1" dirty="0" err="1" smtClean="0">
-                <a:latin typeface="Times New Roman" pitchFamily="18" charset="0"/>
-                <a:cs typeface="Times New Roman" pitchFamily="18" charset="0"/>
-              </a:rPr>
-              <a:t>cơ</a:t>
-            </a:r>
-            <a:r>
-              <a:rPr lang="en-US" b="1" dirty="0" smtClean="0">
-                <a:latin typeface="Times New Roman" pitchFamily="18" charset="0"/>
-                <a:cs typeface="Times New Roman" pitchFamily="18" charset="0"/>
-              </a:rPr>
+              <a:rPr lang="en-US" b="1" dirty="0" err="1" smtClean="0"/>
+              <a:t>chỉ</a:t>
+            </a:r>
+            <a:r>
+              <a:rPr lang="en-US" b="1" dirty="0" smtClean="0"/>
               <a:t> </a:t>
             </a:r>
             <a:r>
-              <a:rPr lang="en-US" b="1" dirty="0" err="1" smtClean="0">
-                <a:latin typeface="Times New Roman" pitchFamily="18" charset="0"/>
-                <a:cs typeface="Times New Roman" pitchFamily="18" charset="0"/>
-              </a:rPr>
-              <a:t>sở</a:t>
-            </a:r>
-            <a:r>
-              <a:rPr lang="en-US" b="1" dirty="0" smtClean="0">
-                <a:latin typeface="Times New Roman" pitchFamily="18" charset="0"/>
-                <a:cs typeface="Times New Roman" pitchFamily="18" charset="0"/>
-              </a:rPr>
+              <a:rPr lang="en-US" b="1" dirty="0" err="1" smtClean="0"/>
+              <a:t>mục</a:t>
+            </a:r>
+            <a:r>
+              <a:rPr lang="en-US" b="1" dirty="0" smtClean="0"/>
               <a:t> </a:t>
             </a:r>
             <a:r>
-              <a:rPr lang="en-US" b="1" dirty="0" err="1" smtClean="0">
-                <a:latin typeface="Times New Roman" pitchFamily="18" charset="0"/>
-                <a:cs typeface="Times New Roman" pitchFamily="18" charset="0"/>
-              </a:rPr>
-              <a:t>chỉ</a:t>
-            </a:r>
-            <a:r>
-              <a:rPr lang="en-US" b="1" dirty="0" smtClean="0">
-                <a:latin typeface="Times New Roman" pitchFamily="18" charset="0"/>
-                <a:cs typeface="Times New Roman" pitchFamily="18" charset="0"/>
-              </a:rPr>
+              <a:rPr lang="en-US" b="1" dirty="0" err="1" smtClean="0"/>
+              <a:t>các</a:t>
+            </a:r>
+            <a:r>
+              <a:rPr lang="en-US" b="1" dirty="0" smtClean="0"/>
               <a:t> </a:t>
             </a:r>
             <a:r>
-              <a:rPr lang="en-US" b="1" dirty="0" err="1" smtClean="0">
-                <a:latin typeface="Times New Roman" pitchFamily="18" charset="0"/>
-                <a:cs typeface="Times New Roman" pitchFamily="18" charset="0"/>
-              </a:rPr>
-              <a:t>mục</a:t>
-            </a:r>
-            <a:r>
-              <a:rPr lang="en-US" b="1" dirty="0" smtClean="0">
-                <a:latin typeface="Times New Roman" pitchFamily="18" charset="0"/>
-                <a:cs typeface="Times New Roman" pitchFamily="18" charset="0"/>
-              </a:rPr>
+              <a:rPr lang="en-US" b="1" dirty="0" err="1" smtClean="0"/>
+              <a:t>bài</a:t>
+            </a:r>
+            <a:r>
+              <a:rPr lang="en-US" b="1" dirty="0" smtClean="0"/>
               <a:t> </a:t>
             </a:r>
             <a:r>
-              <a:rPr lang="en-US" b="1" dirty="0" err="1" smtClean="0">
-                <a:latin typeface="Times New Roman" pitchFamily="18" charset="0"/>
-                <a:cs typeface="Times New Roman" pitchFamily="18" charset="0"/>
-              </a:rPr>
+              <a:rPr lang="en-US" b="1" dirty="0" err="1" smtClean="0"/>
+              <a:t>báo</a:t>
+            </a:r>
+            <a:r>
+              <a:rPr lang="en-US" b="1" dirty="0" smtClean="0"/>
+              <a:t> </a:t>
+            </a:r>
+            <a:r>
+              <a:rPr lang="en-US" b="1" dirty="0" err="1" smtClean="0"/>
+              <a:t>khoa</a:t>
+            </a:r>
+            <a:r>
+              <a:rPr lang="en-US" b="1" dirty="0" smtClean="0"/>
+              <a:t> </a:t>
+            </a:r>
+            <a:r>
+              <a:rPr lang="en-US" b="1" dirty="0" err="1" smtClean="0"/>
+              <a:t>học</a:t>
+            </a:r>
+            <a:r>
+              <a:rPr lang="en-US" b="1" dirty="0" smtClean="0"/>
+              <a:t> </a:t>
+            </a:r>
+          </a:p>
+          <a:p>
+            <a:r>
+              <a:rPr lang="en-US" b="1" dirty="0" err="1" smtClean="0"/>
+              <a:t>được</a:t>
+            </a:r>
+            <a:r>
+              <a:rPr lang="en-US" b="1" dirty="0" smtClean="0"/>
+              <a:t> </a:t>
+            </a:r>
+            <a:r>
+              <a:rPr lang="en-US" b="1" dirty="0" err="1" smtClean="0"/>
+              <a:t>thu</a:t>
+            </a:r>
+            <a:r>
+              <a:rPr lang="en-US" b="1" dirty="0" smtClean="0"/>
+              <a:t> </a:t>
+            </a:r>
+            <a:r>
+              <a:rPr lang="en-US" b="1" dirty="0" err="1" smtClean="0"/>
+              <a:t>thập</a:t>
+            </a:r>
+            <a:r>
+              <a:rPr lang="en-US" b="1" dirty="0" smtClean="0"/>
+              <a:t> </a:t>
+            </a:r>
+            <a:r>
+              <a:rPr lang="en-US" b="1" dirty="0" err="1" smtClean="0"/>
+              <a:t>và</a:t>
+            </a:r>
+            <a:r>
+              <a:rPr lang="en-US" b="1" dirty="0" smtClean="0"/>
+              <a:t> </a:t>
+            </a:r>
+            <a:r>
+              <a:rPr lang="en-US" b="1" dirty="0" err="1" smtClean="0"/>
+              <a:t>phân</a:t>
+            </a:r>
+            <a:r>
+              <a:rPr lang="en-US" b="1" dirty="0" smtClean="0"/>
+              <a:t> </a:t>
+            </a:r>
+            <a:r>
+              <a:rPr lang="en-US" b="1" dirty="0" err="1" smtClean="0"/>
+              <a:t>loại</a:t>
+            </a:r>
+            <a:r>
+              <a:rPr lang="en-US" b="1" dirty="0" smtClean="0"/>
+              <a:t> </a:t>
+            </a:r>
+            <a:r>
+              <a:rPr lang="en-US" b="1" dirty="0" err="1" smtClean="0"/>
+              <a:t>từ</a:t>
+            </a:r>
+            <a:r>
+              <a:rPr lang="en-US" b="1" dirty="0" smtClean="0"/>
+              <a:t> </a:t>
+            </a:r>
+            <a:r>
+              <a:rPr lang="en-US" b="1" dirty="0" err="1" smtClean="0"/>
               <a:t>các</a:t>
             </a:r>
             <a:r>
-              <a:rPr lang="en-US" b="1" dirty="0" smtClean="0">
-                <a:latin typeface="Times New Roman" pitchFamily="18" charset="0"/>
-                <a:cs typeface="Times New Roman" pitchFamily="18" charset="0"/>
-              </a:rPr>
+              <a:rPr lang="en-US" b="1" dirty="0" smtClean="0"/>
               <a:t> </a:t>
             </a:r>
             <a:r>
-              <a:rPr lang="en-US" b="1" dirty="0" err="1" smtClean="0">
-                <a:latin typeface="Times New Roman" pitchFamily="18" charset="0"/>
-                <a:cs typeface="Times New Roman" pitchFamily="18" charset="0"/>
-              </a:rPr>
-              <a:t>bài</a:t>
-            </a:r>
-            <a:r>
-              <a:rPr lang="en-US" b="1" dirty="0" smtClean="0">
-                <a:latin typeface="Times New Roman" pitchFamily="18" charset="0"/>
-                <a:cs typeface="Times New Roman" pitchFamily="18" charset="0"/>
-              </a:rPr>
+              <a:rPr lang="en-US" b="1" dirty="0" err="1" smtClean="0"/>
+              <a:t>thư</a:t>
+            </a:r>
+            <a:r>
+              <a:rPr lang="en-US" b="1" dirty="0" smtClean="0"/>
               <a:t> </a:t>
             </a:r>
             <a:r>
-              <a:rPr lang="en-US" b="1" dirty="0" err="1" smtClean="0">
-                <a:latin typeface="Times New Roman" pitchFamily="18" charset="0"/>
-                <a:cs typeface="Times New Roman" pitchFamily="18" charset="0"/>
-              </a:rPr>
-              <a:t>báo</a:t>
-            </a:r>
-            <a:r>
-              <a:rPr lang="en-US" b="1" dirty="0" smtClean="0">
-                <a:latin typeface="Times New Roman" pitchFamily="18" charset="0"/>
-                <a:cs typeface="Times New Roman" pitchFamily="18" charset="0"/>
-              </a:rPr>
+              <a:rPr lang="en-US" b="1" dirty="0" err="1" smtClean="0"/>
+              <a:t>viện</a:t>
+            </a:r>
+            <a:r>
+              <a:rPr lang="en-US" b="1" dirty="0" smtClean="0"/>
               <a:t> </a:t>
             </a:r>
             <a:r>
-              <a:rPr lang="en-US" b="1" dirty="0" err="1" smtClean="0">
-                <a:latin typeface="Times New Roman" pitchFamily="18" charset="0"/>
-                <a:cs typeface="Times New Roman" pitchFamily="18" charset="0"/>
-              </a:rPr>
-              <a:t>khoa</a:t>
-            </a:r>
-            <a:r>
-              <a:rPr lang="en-US" b="1" dirty="0" smtClean="0">
-                <a:latin typeface="Times New Roman" pitchFamily="18" charset="0"/>
-                <a:cs typeface="Times New Roman" pitchFamily="18" charset="0"/>
-              </a:rPr>
-              <a:t> </a:t>
-            </a:r>
-            <a:r>
-              <a:rPr lang="en-US" b="1" dirty="0" err="1" smtClean="0">
-                <a:latin typeface="Times New Roman" pitchFamily="18" charset="0"/>
-                <a:cs typeface="Times New Roman" pitchFamily="18" charset="0"/>
-              </a:rPr>
-              <a:t>học</a:t>
-            </a:r>
-            <a:r>
-              <a:rPr lang="en-US" b="1" dirty="0" smtClean="0">
-                <a:latin typeface="Times New Roman" pitchFamily="18" charset="0"/>
-                <a:cs typeface="Times New Roman" pitchFamily="18" charset="0"/>
-              </a:rPr>
-              <a:t> </a:t>
-            </a:r>
-          </a:p>
-          <a:p>
-            <a:pPr algn="ctr"/>
-            <a:r>
-              <a:rPr lang="en-US" b="1" dirty="0" err="1" smtClean="0">
-                <a:latin typeface="Times New Roman" pitchFamily="18" charset="0"/>
-                <a:cs typeface="Times New Roman" pitchFamily="18" charset="0"/>
-              </a:rPr>
-              <a:t>Được</a:t>
-            </a:r>
-            <a:r>
-              <a:rPr lang="en-US" b="1" dirty="0" smtClean="0">
-                <a:latin typeface="Times New Roman" pitchFamily="18" charset="0"/>
-                <a:cs typeface="Times New Roman" pitchFamily="18" charset="0"/>
-              </a:rPr>
-              <a:t> </a:t>
-            </a:r>
-            <a:r>
-              <a:rPr lang="en-US" b="1" dirty="0" err="1" smtClean="0">
-                <a:latin typeface="Times New Roman" pitchFamily="18" charset="0"/>
-                <a:cs typeface="Times New Roman" pitchFamily="18" charset="0"/>
-              </a:rPr>
-              <a:t>thu</a:t>
-            </a:r>
-            <a:r>
-              <a:rPr lang="en-US" b="1" dirty="0" smtClean="0">
-                <a:latin typeface="Times New Roman" pitchFamily="18" charset="0"/>
-                <a:cs typeface="Times New Roman" pitchFamily="18" charset="0"/>
-              </a:rPr>
-              <a:t> </a:t>
-            </a:r>
-            <a:r>
-              <a:rPr lang="en-US" b="1" dirty="0" err="1" smtClean="0">
-                <a:latin typeface="Times New Roman" pitchFamily="18" charset="0"/>
-                <a:cs typeface="Times New Roman" pitchFamily="18" charset="0"/>
-              </a:rPr>
-              <a:t>thập</a:t>
-            </a:r>
-            <a:r>
-              <a:rPr lang="en-US" b="1" dirty="0" smtClean="0">
-                <a:latin typeface="Times New Roman" pitchFamily="18" charset="0"/>
-                <a:cs typeface="Times New Roman" pitchFamily="18" charset="0"/>
-              </a:rPr>
-              <a:t> </a:t>
-            </a:r>
-            <a:r>
-              <a:rPr lang="en-US" b="1" dirty="0" err="1" smtClean="0">
-                <a:latin typeface="Times New Roman" pitchFamily="18" charset="0"/>
-                <a:cs typeface="Times New Roman" pitchFamily="18" charset="0"/>
-              </a:rPr>
-              <a:t>và</a:t>
-            </a:r>
-            <a:r>
-              <a:rPr lang="en-US" b="1" dirty="0" smtClean="0">
-                <a:latin typeface="Times New Roman" pitchFamily="18" charset="0"/>
-                <a:cs typeface="Times New Roman" pitchFamily="18" charset="0"/>
-              </a:rPr>
-              <a:t> </a:t>
-            </a:r>
-            <a:r>
-              <a:rPr lang="en-US" b="1" dirty="0" err="1" smtClean="0">
-                <a:latin typeface="Times New Roman" pitchFamily="18" charset="0"/>
-                <a:cs typeface="Times New Roman" pitchFamily="18" charset="0"/>
-              </a:rPr>
-              <a:t>phân</a:t>
-            </a:r>
-            <a:r>
-              <a:rPr lang="en-US" b="1" dirty="0" smtClean="0">
-                <a:latin typeface="Times New Roman" pitchFamily="18" charset="0"/>
-                <a:cs typeface="Times New Roman" pitchFamily="18" charset="0"/>
-              </a:rPr>
-              <a:t> </a:t>
-            </a:r>
-            <a:r>
-              <a:rPr lang="en-US" b="1" dirty="0" err="1" smtClean="0">
-                <a:latin typeface="Times New Roman" pitchFamily="18" charset="0"/>
-                <a:cs typeface="Times New Roman" pitchFamily="18" charset="0"/>
-              </a:rPr>
-              <a:t>loại</a:t>
-            </a:r>
-            <a:r>
-              <a:rPr lang="en-US" b="1" dirty="0" smtClean="0">
-                <a:latin typeface="Times New Roman" pitchFamily="18" charset="0"/>
-                <a:cs typeface="Times New Roman" pitchFamily="18" charset="0"/>
-              </a:rPr>
-              <a:t> </a:t>
-            </a:r>
-            <a:r>
-              <a:rPr lang="en-US" b="1" dirty="0" err="1" smtClean="0">
-                <a:latin typeface="Times New Roman" pitchFamily="18" charset="0"/>
-                <a:cs typeface="Times New Roman" pitchFamily="18" charset="0"/>
-              </a:rPr>
-              <a:t>từ</a:t>
-            </a:r>
-            <a:r>
-              <a:rPr lang="en-US" b="1" dirty="0" smtClean="0">
-                <a:latin typeface="Times New Roman" pitchFamily="18" charset="0"/>
-                <a:cs typeface="Times New Roman" pitchFamily="18" charset="0"/>
-              </a:rPr>
-              <a:t> </a:t>
-            </a:r>
-            <a:r>
-              <a:rPr lang="en-US" b="1" dirty="0" err="1" smtClean="0">
-                <a:latin typeface="Times New Roman" pitchFamily="18" charset="0"/>
-                <a:cs typeface="Times New Roman" pitchFamily="18" charset="0"/>
-              </a:rPr>
-              <a:t>các</a:t>
-            </a:r>
-            <a:r>
-              <a:rPr lang="en-US" b="1" dirty="0" smtClean="0">
-                <a:latin typeface="Times New Roman" pitchFamily="18" charset="0"/>
-                <a:cs typeface="Times New Roman" pitchFamily="18" charset="0"/>
-              </a:rPr>
-              <a:t> </a:t>
-            </a:r>
-            <a:r>
-              <a:rPr lang="en-US" b="1" dirty="0" err="1" smtClean="0">
-                <a:latin typeface="Times New Roman" pitchFamily="18" charset="0"/>
-                <a:cs typeface="Times New Roman" pitchFamily="18" charset="0"/>
-              </a:rPr>
-              <a:t>thư</a:t>
-            </a:r>
-            <a:r>
-              <a:rPr lang="en-US" b="1" dirty="0" smtClean="0">
-                <a:latin typeface="Times New Roman" pitchFamily="18" charset="0"/>
-                <a:cs typeface="Times New Roman" pitchFamily="18" charset="0"/>
-              </a:rPr>
-              <a:t> </a:t>
-            </a:r>
-            <a:r>
-              <a:rPr lang="en-US" b="1" dirty="0" err="1" smtClean="0">
-                <a:latin typeface="Times New Roman" pitchFamily="18" charset="0"/>
-                <a:cs typeface="Times New Roman" pitchFamily="18" charset="0"/>
-              </a:rPr>
-              <a:t>viện</a:t>
-            </a:r>
-            <a:r>
-              <a:rPr lang="en-US" b="1" dirty="0" smtClean="0">
-                <a:latin typeface="Times New Roman" pitchFamily="18" charset="0"/>
-                <a:cs typeface="Times New Roman" pitchFamily="18" charset="0"/>
-              </a:rPr>
-              <a:t> </a:t>
-            </a:r>
-            <a:r>
-              <a:rPr lang="en-US" b="1" dirty="0" err="1" smtClean="0">
-                <a:latin typeface="Times New Roman" pitchFamily="18" charset="0"/>
-                <a:cs typeface="Times New Roman" pitchFamily="18" charset="0"/>
-              </a:rPr>
+              <a:rPr lang="en-US" b="1" dirty="0" err="1" smtClean="0"/>
               <a:t>số</a:t>
             </a:r>
             <a:r>
-              <a:rPr lang="en-US" b="1" dirty="0" smtClean="0">
-                <a:latin typeface="Times New Roman" pitchFamily="18" charset="0"/>
-                <a:cs typeface="Times New Roman" pitchFamily="18" charset="0"/>
-              </a:rPr>
+              <a:rPr lang="en-US" b="1" dirty="0" smtClean="0"/>
               <a:t>. </a:t>
             </a:r>
-            <a:endParaRPr lang="en-US" b="1" dirty="0">
-              <a:latin typeface="Times New Roman" pitchFamily="18" charset="0"/>
-              <a:cs typeface="Times New Roman" pitchFamily="18" charset="0"/>
-            </a:endParaRPr>
+            <a:endParaRPr lang="en-US" b="1" dirty="0"/>
           </a:p>
         </p:txBody>
       </p:sp>
@@ -4350,14 +4185,7 @@
                 <a:latin typeface="Times New Roman" pitchFamily="18" charset="0"/>
                 <a:cs typeface="Times New Roman" pitchFamily="18" charset="0"/>
               </a:rPr>
-              <a:t>(1) Module </a:t>
-            </a:r>
-            <a:r>
-              <a:rPr lang="en-US" sz="1300" b="1" dirty="0" smtClean="0">
-                <a:latin typeface="Times New Roman" pitchFamily="18" charset="0"/>
-                <a:cs typeface="Times New Roman" pitchFamily="18" charset="0"/>
-              </a:rPr>
-              <a:t>Thu </a:t>
+              <a:t>(1) Module Thu </a:t>
             </a:r>
             <a:r>
               <a:rPr lang="en-US" sz="1300" b="1" dirty="0" err="1" smtClean="0">

</xml_diff>

<commit_message>
Chinh sua ngay 31/8
</commit_message>
<xml_diff>
--- a/Outline thesis/De cuong/Kientrucdetai_26_8.pptx
+++ b/Outline thesis/De cuong/Kientrucdetai_26_8.pptx
@@ -291,7 +291,7 @@
             <a:fld id="{1D8BD707-D9CF-40AE-B4C6-C98DA3205C09}" type="datetimeFigureOut">
               <a:rPr lang="en-US" smtClean="0"/>
               <a:pPr/>
-              <a:t>8/29/2010</a:t>
+              <a:t>8/30/2010</a:t>
             </a:fld>
             <a:endParaRPr lang="en-US"/>
           </a:p>
@@ -458,7 +458,7 @@
             <a:fld id="{1D8BD707-D9CF-40AE-B4C6-C98DA3205C09}" type="datetimeFigureOut">
               <a:rPr lang="en-US" smtClean="0"/>
               <a:pPr/>
-              <a:t>8/29/2010</a:t>
+              <a:t>8/30/2010</a:t>
             </a:fld>
             <a:endParaRPr lang="en-US"/>
           </a:p>
@@ -635,7 +635,7 @@
             <a:fld id="{1D8BD707-D9CF-40AE-B4C6-C98DA3205C09}" type="datetimeFigureOut">
               <a:rPr lang="en-US" smtClean="0"/>
               <a:pPr/>
-              <a:t>8/29/2010</a:t>
+              <a:t>8/30/2010</a:t>
             </a:fld>
             <a:endParaRPr lang="en-US"/>
           </a:p>
@@ -802,7 +802,7 @@
             <a:fld id="{1D8BD707-D9CF-40AE-B4C6-C98DA3205C09}" type="datetimeFigureOut">
               <a:rPr lang="en-US" smtClean="0"/>
               <a:pPr/>
-              <a:t>8/29/2010</a:t>
+              <a:t>8/30/2010</a:t>
             </a:fld>
             <a:endParaRPr lang="en-US"/>
           </a:p>
@@ -1045,7 +1045,7 @@
             <a:fld id="{1D8BD707-D9CF-40AE-B4C6-C98DA3205C09}" type="datetimeFigureOut">
               <a:rPr lang="en-US" smtClean="0"/>
               <a:pPr/>
-              <a:t>8/29/2010</a:t>
+              <a:t>8/30/2010</a:t>
             </a:fld>
             <a:endParaRPr lang="en-US"/>
           </a:p>
@@ -1330,7 +1330,7 @@
             <a:fld id="{1D8BD707-D9CF-40AE-B4C6-C98DA3205C09}" type="datetimeFigureOut">
               <a:rPr lang="en-US" smtClean="0"/>
               <a:pPr/>
-              <a:t>8/29/2010</a:t>
+              <a:t>8/30/2010</a:t>
             </a:fld>
             <a:endParaRPr lang="en-US"/>
           </a:p>
@@ -1749,7 +1749,7 @@
             <a:fld id="{1D8BD707-D9CF-40AE-B4C6-C98DA3205C09}" type="datetimeFigureOut">
               <a:rPr lang="en-US" smtClean="0"/>
               <a:pPr/>
-              <a:t>8/29/2010</a:t>
+              <a:t>8/30/2010</a:t>
             </a:fld>
             <a:endParaRPr lang="en-US"/>
           </a:p>
@@ -1864,7 +1864,7 @@
             <a:fld id="{1D8BD707-D9CF-40AE-B4C6-C98DA3205C09}" type="datetimeFigureOut">
               <a:rPr lang="en-US" smtClean="0"/>
               <a:pPr/>
-              <a:t>8/29/2010</a:t>
+              <a:t>8/30/2010</a:t>
             </a:fld>
             <a:endParaRPr lang="en-US"/>
           </a:p>
@@ -1956,7 +1956,7 @@
             <a:fld id="{1D8BD707-D9CF-40AE-B4C6-C98DA3205C09}" type="datetimeFigureOut">
               <a:rPr lang="en-US" smtClean="0"/>
               <a:pPr/>
-              <a:t>8/29/2010</a:t>
+              <a:t>8/30/2010</a:t>
             </a:fld>
             <a:endParaRPr lang="en-US"/>
           </a:p>
@@ -2230,7 +2230,7 @@
             <a:fld id="{1D8BD707-D9CF-40AE-B4C6-C98DA3205C09}" type="datetimeFigureOut">
               <a:rPr lang="en-US" smtClean="0"/>
               <a:pPr/>
-              <a:t>8/29/2010</a:t>
+              <a:t>8/30/2010</a:t>
             </a:fld>
             <a:endParaRPr lang="en-US"/>
           </a:p>
@@ -2480,7 +2480,7 @@
             <a:fld id="{1D8BD707-D9CF-40AE-B4C6-C98DA3205C09}" type="datetimeFigureOut">
               <a:rPr lang="en-US" smtClean="0"/>
               <a:pPr/>
-              <a:t>8/29/2010</a:t>
+              <a:t>8/30/2010</a:t>
             </a:fld>
             <a:endParaRPr lang="en-US"/>
           </a:p>
@@ -2690,7 +2690,7 @@
             <a:fld id="{1D8BD707-D9CF-40AE-B4C6-C98DA3205C09}" type="datetimeFigureOut">
               <a:rPr lang="en-US" smtClean="0"/>
               <a:pPr/>
-              <a:t>8/29/2010</a:t>
+              <a:t>8/30/2010</a:t>
             </a:fld>
             <a:endParaRPr lang="en-US"/>
           </a:p>
@@ -4286,7 +4286,7 @@
         </p:nvSpPr>
         <p:spPr>
           <a:xfrm>
-            <a:off x="0" y="2971800"/>
+            <a:off x="0" y="3124200"/>
             <a:ext cx="1524000" cy="1219200"/>
           </a:xfrm>
           <a:prstGeom prst="flowChartMagneticDisk">

</xml_diff>

<commit_message>
Chinh sua kien truc de tai 31/8 them module
</commit_message>
<xml_diff>
--- a/Outline thesis/De cuong/Kientrucdetai_26_8.pptx
+++ b/Outline thesis/De cuong/Kientrucdetai_26_8.pptx
@@ -8,6 +8,7 @@
     <p:sldId id="256" r:id="rId2"/>
     <p:sldId id="257" r:id="rId3"/>
     <p:sldId id="260" r:id="rId4"/>
+    <p:sldId id="261" r:id="rId5"/>
   </p:sldIdLst>
   <p:sldSz cx="9144000" cy="6858000" type="screen4x3"/>
   <p:notesSz cx="6858000" cy="9144000"/>
@@ -291,7 +292,7 @@
             <a:fld id="{1D8BD707-D9CF-40AE-B4C6-C98DA3205C09}" type="datetimeFigureOut">
               <a:rPr lang="en-US" smtClean="0"/>
               <a:pPr/>
-              <a:t>8/30/2010</a:t>
+              <a:t>8/31/2010</a:t>
             </a:fld>
             <a:endParaRPr lang="en-US"/>
           </a:p>
@@ -458,7 +459,7 @@
             <a:fld id="{1D8BD707-D9CF-40AE-B4C6-C98DA3205C09}" type="datetimeFigureOut">
               <a:rPr lang="en-US" smtClean="0"/>
               <a:pPr/>
-              <a:t>8/30/2010</a:t>
+              <a:t>8/31/2010</a:t>
             </a:fld>
             <a:endParaRPr lang="en-US"/>
           </a:p>
@@ -635,7 +636,7 @@
             <a:fld id="{1D8BD707-D9CF-40AE-B4C6-C98DA3205C09}" type="datetimeFigureOut">
               <a:rPr lang="en-US" smtClean="0"/>
               <a:pPr/>
-              <a:t>8/30/2010</a:t>
+              <a:t>8/31/2010</a:t>
             </a:fld>
             <a:endParaRPr lang="en-US"/>
           </a:p>
@@ -802,7 +803,7 @@
             <a:fld id="{1D8BD707-D9CF-40AE-B4C6-C98DA3205C09}" type="datetimeFigureOut">
               <a:rPr lang="en-US" smtClean="0"/>
               <a:pPr/>
-              <a:t>8/30/2010</a:t>
+              <a:t>8/31/2010</a:t>
             </a:fld>
             <a:endParaRPr lang="en-US"/>
           </a:p>
@@ -1045,7 +1046,7 @@
             <a:fld id="{1D8BD707-D9CF-40AE-B4C6-C98DA3205C09}" type="datetimeFigureOut">
               <a:rPr lang="en-US" smtClean="0"/>
               <a:pPr/>
-              <a:t>8/30/2010</a:t>
+              <a:t>8/31/2010</a:t>
             </a:fld>
             <a:endParaRPr lang="en-US"/>
           </a:p>
@@ -1330,7 +1331,7 @@
             <a:fld id="{1D8BD707-D9CF-40AE-B4C6-C98DA3205C09}" type="datetimeFigureOut">
               <a:rPr lang="en-US" smtClean="0"/>
               <a:pPr/>
-              <a:t>8/30/2010</a:t>
+              <a:t>8/31/2010</a:t>
             </a:fld>
             <a:endParaRPr lang="en-US"/>
           </a:p>
@@ -1749,7 +1750,7 @@
             <a:fld id="{1D8BD707-D9CF-40AE-B4C6-C98DA3205C09}" type="datetimeFigureOut">
               <a:rPr lang="en-US" smtClean="0"/>
               <a:pPr/>
-              <a:t>8/30/2010</a:t>
+              <a:t>8/31/2010</a:t>
             </a:fld>
             <a:endParaRPr lang="en-US"/>
           </a:p>
@@ -1864,7 +1865,7 @@
             <a:fld id="{1D8BD707-D9CF-40AE-B4C6-C98DA3205C09}" type="datetimeFigureOut">
               <a:rPr lang="en-US" smtClean="0"/>
               <a:pPr/>
-              <a:t>8/30/2010</a:t>
+              <a:t>8/31/2010</a:t>
             </a:fld>
             <a:endParaRPr lang="en-US"/>
           </a:p>
@@ -1956,7 +1957,7 @@
             <a:fld id="{1D8BD707-D9CF-40AE-B4C6-C98DA3205C09}" type="datetimeFigureOut">
               <a:rPr lang="en-US" smtClean="0"/>
               <a:pPr/>
-              <a:t>8/30/2010</a:t>
+              <a:t>8/31/2010</a:t>
             </a:fld>
             <a:endParaRPr lang="en-US"/>
           </a:p>
@@ -2230,7 +2231,7 @@
             <a:fld id="{1D8BD707-D9CF-40AE-B4C6-C98DA3205C09}" type="datetimeFigureOut">
               <a:rPr lang="en-US" smtClean="0"/>
               <a:pPr/>
-              <a:t>8/30/2010</a:t>
+              <a:t>8/31/2010</a:t>
             </a:fld>
             <a:endParaRPr lang="en-US"/>
           </a:p>
@@ -2480,7 +2481,7 @@
             <a:fld id="{1D8BD707-D9CF-40AE-B4C6-C98DA3205C09}" type="datetimeFigureOut">
               <a:rPr lang="en-US" smtClean="0"/>
               <a:pPr/>
-              <a:t>8/30/2010</a:t>
+              <a:t>8/31/2010</a:t>
             </a:fld>
             <a:endParaRPr lang="en-US"/>
           </a:p>
@@ -2690,7 +2691,7 @@
             <a:fld id="{1D8BD707-D9CF-40AE-B4C6-C98DA3205C09}" type="datetimeFigureOut">
               <a:rPr lang="en-US" smtClean="0"/>
               <a:pPr/>
-              <a:t>8/30/2010</a:t>
+              <a:t>8/31/2010</a:t>
             </a:fld>
             <a:endParaRPr lang="en-US"/>
           </a:p>
@@ -3158,7 +3159,7 @@
         </p:nvSpPr>
         <p:spPr>
           <a:xfrm>
-            <a:off x="2895600" y="2819400"/>
+            <a:off x="2895600" y="3429000"/>
             <a:ext cx="1447800" cy="1295400"/>
           </a:xfrm>
           <a:prstGeom prst="flowChartMultidocument">
@@ -4038,8 +4039,8 @@
         </p:nvSpPr>
         <p:spPr>
           <a:xfrm>
-            <a:off x="3048000" y="1371600"/>
-            <a:ext cx="1371600" cy="685800"/>
+            <a:off x="3048000" y="1295400"/>
+            <a:ext cx="1371600" cy="762000"/>
           </a:xfrm>
           <a:prstGeom prst="rect">
             <a:avLst/>
@@ -4076,15 +4077,7 @@
             </a:r>
             <a:r>
               <a:rPr lang="en-US" dirty="0" err="1" smtClean="0"/>
-              <a:t>Trích</a:t>
-            </a:r>
-            <a:r>
-              <a:rPr lang="en-US" dirty="0" smtClean="0"/>
-              <a:t>  </a:t>
-            </a:r>
-            <a:r>
-              <a:rPr lang="en-US" dirty="0" err="1" smtClean="0"/>
-              <a:t>Dữ</a:t>
+              <a:t>trích</a:t>
             </a:r>
             <a:r>
               <a:rPr lang="en-US" dirty="0" smtClean="0"/>
@@ -4092,7 +4085,23 @@
             </a:r>
             <a:r>
               <a:rPr lang="en-US" dirty="0" err="1" smtClean="0"/>
-              <a:t>liệu</a:t>
+              <a:t>thông</a:t>
+            </a:r>
+            <a:r>
+              <a:rPr lang="en-US" dirty="0" smtClean="0"/>
+              <a:t> tin </a:t>
+            </a:r>
+            <a:r>
+              <a:rPr lang="en-US" dirty="0" err="1" smtClean="0"/>
+              <a:t>bài</a:t>
+            </a:r>
+            <a:r>
+              <a:rPr lang="en-US" dirty="0" smtClean="0"/>
+              <a:t> </a:t>
+            </a:r>
+            <a:r>
+              <a:rPr lang="en-US" dirty="0" err="1" smtClean="0"/>
+              <a:t>báo</a:t>
             </a:r>
             <a:endParaRPr lang="en-US" dirty="0"/>
           </a:p>
@@ -4146,8 +4155,8 @@
         </p:nvSpPr>
         <p:spPr>
           <a:xfrm rot="5400000">
-            <a:off x="3314700" y="2400300"/>
-            <a:ext cx="685800" cy="152400"/>
+            <a:off x="3086100" y="2628900"/>
+            <a:ext cx="1143000" cy="152400"/>
           </a:xfrm>
           <a:prstGeom prst="rightArrow">
             <a:avLst/>
@@ -4216,7 +4225,7 @@
         </p:nvSpPr>
         <p:spPr>
           <a:xfrm>
-            <a:off x="4419600" y="3429000"/>
+            <a:off x="4419600" y="3962400"/>
             <a:ext cx="1219200" cy="228600"/>
           </a:xfrm>
           <a:prstGeom prst="rightArrow">
@@ -4256,7 +4265,7 @@
         </p:nvSpPr>
         <p:spPr>
           <a:xfrm>
-            <a:off x="4419600" y="3048000"/>
+            <a:off x="4419600" y="3505200"/>
             <a:ext cx="1143000" cy="369332"/>
           </a:xfrm>
           <a:prstGeom prst="rect">
@@ -4286,8 +4295,8 @@
         </p:nvSpPr>
         <p:spPr>
           <a:xfrm>
-            <a:off x="0" y="3124200"/>
-            <a:ext cx="1524000" cy="1219200"/>
+            <a:off x="0" y="4038600"/>
+            <a:ext cx="1524000" cy="1828800"/>
           </a:xfrm>
           <a:prstGeom prst="flowChartMagneticDisk">
             <a:avLst/>
@@ -4370,8 +4379,8 @@
         </p:nvSpPr>
         <p:spPr>
           <a:xfrm>
-            <a:off x="1600200" y="3657600"/>
-            <a:ext cx="1219200" cy="228600"/>
+            <a:off x="1524000" y="4343400"/>
+            <a:ext cx="1295400" cy="228600"/>
           </a:xfrm>
           <a:prstGeom prst="rightArrow">
             <a:avLst/>
@@ -4410,7 +4419,7 @@
         </p:nvSpPr>
         <p:spPr>
           <a:xfrm>
-            <a:off x="1600200" y="3276600"/>
+            <a:off x="1600200" y="3962400"/>
             <a:ext cx="1143000" cy="369332"/>
           </a:xfrm>
           <a:prstGeom prst="rect">
@@ -4440,8 +4449,8 @@
         </p:nvSpPr>
         <p:spPr>
           <a:xfrm rot="16200000">
-            <a:off x="2813566" y="2063234"/>
-            <a:ext cx="1143000" cy="369332"/>
+            <a:off x="2623068" y="2497722"/>
+            <a:ext cx="1523999" cy="338554"/>
           </a:xfrm>
           <a:prstGeom prst="rect">
             <a:avLst/>
@@ -4455,8 +4464,82 @@
           <a:lstStyle/>
           <a:p>
             <a:r>
+              <a:rPr lang="en-US" sz="1600" dirty="0" smtClean="0"/>
+              <a:t>Title, </a:t>
+            </a:r>
+            <a:r>
+              <a:rPr lang="en-US" sz="1600" dirty="0" err="1" smtClean="0"/>
+              <a:t>Abtrach</a:t>
+            </a:r>
+            <a:endParaRPr lang="en-US" sz="1600" dirty="0"/>
+          </a:p>
+        </p:txBody>
+      </p:sp>
+      <p:sp>
+        <p:nvSpPr>
+          <p:cNvPr id="35" name="Right Arrow 34"/>
+          <p:cNvSpPr/>
+          <p:nvPr/>
+        </p:nvSpPr>
+        <p:spPr>
+          <a:xfrm>
+            <a:off x="1524000" y="5029200"/>
+            <a:ext cx="3962400" cy="228600"/>
+          </a:xfrm>
+          <a:prstGeom prst="rightArrow">
+            <a:avLst/>
+          </a:prstGeom>
+        </p:spPr>
+        <p:style>
+          <a:lnRef idx="2">
+            <a:schemeClr val="accent1">
+              <a:shade val="50000"/>
+            </a:schemeClr>
+          </a:lnRef>
+          <a:fillRef idx="1">
+            <a:schemeClr val="accent1"/>
+          </a:fillRef>
+          <a:effectRef idx="0">
+            <a:schemeClr val="accent1"/>
+          </a:effectRef>
+          <a:fontRef idx="minor">
+            <a:schemeClr val="lt1"/>
+          </a:fontRef>
+        </p:style>
+        <p:txBody>
+          <a:bodyPr rtlCol="0" anchor="ctr"/>
+          <a:lstStyle/>
+          <a:p>
+            <a:pPr algn="ctr"/>
+            <a:endParaRPr lang="en-US"/>
+          </a:p>
+        </p:txBody>
+      </p:sp>
+      <p:sp>
+        <p:nvSpPr>
+          <p:cNvPr id="36" name="TextBox 35"/>
+          <p:cNvSpPr txBox="1"/>
+          <p:nvPr/>
+        </p:nvSpPr>
+        <p:spPr>
+          <a:xfrm>
+            <a:off x="1676400" y="4724400"/>
+            <a:ext cx="1600200" cy="369332"/>
+          </a:xfrm>
+          <a:prstGeom prst="rect">
+            <a:avLst/>
+          </a:prstGeom>
+          <a:noFill/>
+        </p:spPr>
+        <p:txBody>
+          <a:bodyPr wrap="square" rtlCol="0">
+            <a:spAutoFit/>
+          </a:bodyPr>
+          <a:lstStyle/>
+          <a:p>
+            <a:r>
               <a:rPr lang="en-US" dirty="0" smtClean="0"/>
-              <a:t>Title</a:t>
+              <a:t>Metadata</a:t>
             </a:r>
             <a:endParaRPr lang="en-US" dirty="0"/>
           </a:p>
@@ -5858,6 +5941,84 @@
           </a:fontRef>
         </p:style>
       </p:cxnSp>
+      <p:sp>
+        <p:nvSpPr>
+          <p:cNvPr id="20" name="Rectangle 19"/>
+          <p:cNvSpPr/>
+          <p:nvPr/>
+        </p:nvSpPr>
+        <p:spPr>
+          <a:xfrm>
+            <a:off x="7053363" y="1066800"/>
+            <a:ext cx="1879232" cy="292388"/>
+          </a:xfrm>
+          <a:prstGeom prst="rect">
+            <a:avLst/>
+          </a:prstGeom>
+        </p:spPr>
+        <p:txBody>
+          <a:bodyPr wrap="none">
+            <a:spAutoFit/>
+          </a:bodyPr>
+          <a:lstStyle/>
+          <a:p>
+            <a:pPr algn="ctr"/>
+            <a:r>
+              <a:rPr lang="en-US" sz="1300" b="1" dirty="0" err="1" smtClean="0">
+                <a:latin typeface="Times New Roman" pitchFamily="18" charset="0"/>
+                <a:cs typeface="Times New Roman" pitchFamily="18" charset="0"/>
+              </a:rPr>
+              <a:t>Thông</a:t>
+            </a:r>
+            <a:r>
+              <a:rPr lang="en-US" sz="1300" b="1" dirty="0" smtClean="0">
+                <a:latin typeface="Times New Roman" pitchFamily="18" charset="0"/>
+                <a:cs typeface="Times New Roman" pitchFamily="18" charset="0"/>
+              </a:rPr>
+              <a:t> tin </a:t>
+            </a:r>
+            <a:r>
+              <a:rPr lang="en-US" sz="1300" b="1" dirty="0" err="1" smtClean="0">
+                <a:latin typeface="Times New Roman" pitchFamily="18" charset="0"/>
+                <a:cs typeface="Times New Roman" pitchFamily="18" charset="0"/>
+              </a:rPr>
+              <a:t>trong</a:t>
+            </a:r>
+            <a:r>
+              <a:rPr lang="en-US" sz="1300" b="1" dirty="0" smtClean="0">
+                <a:latin typeface="Times New Roman" pitchFamily="18" charset="0"/>
+                <a:cs typeface="Times New Roman" pitchFamily="18" charset="0"/>
+              </a:rPr>
+              <a:t> </a:t>
+            </a:r>
+            <a:r>
+              <a:rPr lang="en-US" sz="1300" b="1" dirty="0" err="1" smtClean="0">
+                <a:latin typeface="Times New Roman" pitchFamily="18" charset="0"/>
+                <a:cs typeface="Times New Roman" pitchFamily="18" charset="0"/>
+              </a:rPr>
+              <a:t>bài</a:t>
+            </a:r>
+            <a:r>
+              <a:rPr lang="en-US" sz="1300" b="1" dirty="0" smtClean="0">
+                <a:latin typeface="Times New Roman" pitchFamily="18" charset="0"/>
+                <a:cs typeface="Times New Roman" pitchFamily="18" charset="0"/>
+              </a:rPr>
+              <a:t> </a:t>
+            </a:r>
+            <a:r>
+              <a:rPr lang="en-US" sz="1300" b="1" dirty="0" err="1" smtClean="0">
+                <a:latin typeface="Times New Roman" pitchFamily="18" charset="0"/>
+                <a:cs typeface="Times New Roman" pitchFamily="18" charset="0"/>
+              </a:rPr>
+              <a:t>báo</a:t>
+            </a:r>
+            <a:endParaRPr lang="en-US" sz="1300" b="1" dirty="0" smtClean="0">
+              <a:latin typeface="Times New Roman" pitchFamily="18" charset="0"/>
+              <a:cs typeface="Times New Roman" pitchFamily="18" charset="0"/>
+            </a:endParaRPr>
+          </a:p>
+        </p:txBody>
+      </p:sp>
     </p:spTree>
   </p:cSld>
   <p:clrMapOvr>
@@ -6001,6 +6162,19 @@
               </a:rPr>
               <a:t>Title</a:t>
             </a:r>
+          </a:p>
+          <a:p>
+            <a:pPr algn="ctr"/>
+            <a:r>
+              <a:rPr lang="en-US" sz="1300" b="1" dirty="0" err="1" smtClean="0">
+                <a:solidFill>
+                  <a:schemeClr val="tx1"/>
+                </a:solidFill>
+                <a:latin typeface="Times New Roman" pitchFamily="18" charset="0"/>
+                <a:cs typeface="Times New Roman" pitchFamily="18" charset="0"/>
+              </a:rPr>
+              <a:t>Abtract</a:t>
+            </a:r>
             <a:endParaRPr lang="en-US" sz="1300" b="1" dirty="0">
               <a:solidFill>
                 <a:schemeClr val="tx1"/>
@@ -6443,6 +6617,19 @@
                 <a:cs typeface="Times New Roman" pitchFamily="18" charset="0"/>
               </a:rPr>
               <a:t>Title</a:t>
+            </a:r>
+          </a:p>
+          <a:p>
+            <a:pPr algn="ctr"/>
+            <a:r>
+              <a:rPr lang="en-US" sz="1300" b="1" dirty="0" err="1" smtClean="0">
+                <a:solidFill>
+                  <a:schemeClr val="tx1"/>
+                </a:solidFill>
+                <a:latin typeface="Times New Roman" pitchFamily="18" charset="0"/>
+                <a:cs typeface="Times New Roman" pitchFamily="18" charset="0"/>
+              </a:rPr>
+              <a:t>Abtract</a:t>
             </a:r>
             <a:endParaRPr lang="en-US" sz="1300" b="1" dirty="0">
               <a:solidFill>
@@ -7060,6 +7247,1034 @@
               <a:t>Học</a:t>
             </a:r>
             <a:endParaRPr lang="en-US" b="1" dirty="0" smtClean="0">
+              <a:latin typeface="Times New Roman" pitchFamily="18" charset="0"/>
+              <a:cs typeface="Times New Roman" pitchFamily="18" charset="0"/>
+            </a:endParaRPr>
+          </a:p>
+        </p:txBody>
+      </p:sp>
+    </p:spTree>
+  </p:cSld>
+  <p:clrMapOvr>
+    <a:masterClrMapping/>
+  </p:clrMapOvr>
+  <p:timing>
+    <p:tnLst>
+      <p:par>
+        <p:cTn id="1" dur="indefinite" restart="never" nodeType="tmRoot"/>
+      </p:par>
+    </p:tnLst>
+  </p:timing>
+</p:sld>
+</file>
+
+<file path=ppt/slides/slide4.xml><?xml version="1.0" encoding="utf-8"?>
+<p:sld xmlns:a="http://schemas.openxmlformats.org/drawingml/2006/main" xmlns:r="http://schemas.openxmlformats.org/officeDocument/2006/relationships" xmlns:p="http://schemas.openxmlformats.org/presentationml/2006/main">
+  <p:cSld>
+    <p:spTree>
+      <p:nvGrpSpPr>
+        <p:cNvPr id="1" name=""/>
+        <p:cNvGrpSpPr/>
+        <p:nvPr/>
+      </p:nvGrpSpPr>
+      <p:grpSpPr>
+        <a:xfrm>
+          <a:off x="0" y="0"/>
+          <a:ext cx="0" cy="0"/>
+          <a:chOff x="0" y="0"/>
+          <a:chExt cx="0" cy="0"/>
+        </a:xfrm>
+      </p:grpSpPr>
+      <p:sp>
+        <p:nvSpPr>
+          <p:cNvPr id="21" name="Flowchart: Magnetic Disk 20"/>
+          <p:cNvSpPr/>
+          <p:nvPr/>
+        </p:nvSpPr>
+        <p:spPr>
+          <a:xfrm>
+            <a:off x="228600" y="2133600"/>
+            <a:ext cx="1295400" cy="1752600"/>
+          </a:xfrm>
+          <a:prstGeom prst="flowChartMagneticDisk">
+            <a:avLst/>
+          </a:prstGeom>
+          <a:solidFill>
+            <a:schemeClr val="accent2"/>
+          </a:solidFill>
+        </p:spPr>
+        <p:style>
+          <a:lnRef idx="2">
+            <a:schemeClr val="accent1">
+              <a:shade val="50000"/>
+            </a:schemeClr>
+          </a:lnRef>
+          <a:fillRef idx="1">
+            <a:schemeClr val="accent1"/>
+          </a:fillRef>
+          <a:effectRef idx="0">
+            <a:schemeClr val="accent1"/>
+          </a:effectRef>
+          <a:fontRef idx="minor">
+            <a:schemeClr val="lt1"/>
+          </a:fontRef>
+        </p:style>
+        <p:txBody>
+          <a:bodyPr rtlCol="0" anchor="ctr"/>
+          <a:lstStyle/>
+          <a:p>
+            <a:pPr algn="ctr"/>
+            <a:r>
+              <a:rPr lang="en-US" sz="1400" b="1" dirty="0" smtClean="0">
+                <a:latin typeface="Times New Roman" pitchFamily="18" charset="0"/>
+                <a:cs typeface="Times New Roman" pitchFamily="18" charset="0"/>
+              </a:rPr>
+              <a:t>CSDL</a:t>
+            </a:r>
+          </a:p>
+          <a:p>
+            <a:pPr algn="ctr"/>
+            <a:r>
+              <a:rPr lang="en-US" sz="1400" b="1" dirty="0" err="1" smtClean="0">
+                <a:latin typeface="Times New Roman" pitchFamily="18" charset="0"/>
+                <a:cs typeface="Times New Roman" pitchFamily="18" charset="0"/>
+              </a:rPr>
+              <a:t>Có</a:t>
+            </a:r>
+            <a:r>
+              <a:rPr lang="en-US" sz="1400" b="1" dirty="0" smtClean="0">
+                <a:latin typeface="Times New Roman" pitchFamily="18" charset="0"/>
+                <a:cs typeface="Times New Roman" pitchFamily="18" charset="0"/>
+              </a:rPr>
+              <a:t> </a:t>
+            </a:r>
+            <a:r>
+              <a:rPr lang="en-US" sz="1400" b="1" dirty="0" err="1" smtClean="0">
+                <a:latin typeface="Times New Roman" pitchFamily="18" charset="0"/>
+                <a:cs typeface="Times New Roman" pitchFamily="18" charset="0"/>
+              </a:rPr>
+              <a:t>sẵn</a:t>
+            </a:r>
+            <a:r>
+              <a:rPr lang="en-US" sz="1400" b="1" dirty="0" smtClean="0">
+                <a:latin typeface="Times New Roman" pitchFamily="18" charset="0"/>
+                <a:cs typeface="Times New Roman" pitchFamily="18" charset="0"/>
+              </a:rPr>
+              <a:t> </a:t>
+            </a:r>
+            <a:endParaRPr lang="en-US" sz="1400" b="1" dirty="0">
+              <a:latin typeface="Times New Roman" pitchFamily="18" charset="0"/>
+              <a:cs typeface="Times New Roman" pitchFamily="18" charset="0"/>
+            </a:endParaRPr>
+          </a:p>
+        </p:txBody>
+      </p:sp>
+      <p:sp>
+        <p:nvSpPr>
+          <p:cNvPr id="32" name="Flowchart: Document 31"/>
+          <p:cNvSpPr/>
+          <p:nvPr/>
+        </p:nvSpPr>
+        <p:spPr>
+          <a:xfrm>
+            <a:off x="3048000" y="1981200"/>
+            <a:ext cx="1371600" cy="1905000"/>
+          </a:xfrm>
+          <a:prstGeom prst="flowChartDocument">
+            <a:avLst/>
+          </a:prstGeom>
+          <a:solidFill>
+            <a:schemeClr val="accent1"/>
+          </a:solidFill>
+        </p:spPr>
+        <p:style>
+          <a:lnRef idx="2">
+            <a:schemeClr val="accent1">
+              <a:shade val="50000"/>
+            </a:schemeClr>
+          </a:lnRef>
+          <a:fillRef idx="1">
+            <a:schemeClr val="accent1"/>
+          </a:fillRef>
+          <a:effectRef idx="0">
+            <a:schemeClr val="accent1"/>
+          </a:effectRef>
+          <a:fontRef idx="minor">
+            <a:schemeClr val="lt1"/>
+          </a:fontRef>
+        </p:style>
+        <p:txBody>
+          <a:bodyPr rtlCol="0" anchor="ctr"/>
+          <a:lstStyle/>
+          <a:p>
+            <a:pPr algn="ctr"/>
+            <a:endParaRPr lang="en-US" sz="1300" b="1" dirty="0">
+              <a:solidFill>
+                <a:schemeClr val="tx1"/>
+              </a:solidFill>
+              <a:latin typeface="Times New Roman" pitchFamily="18" charset="0"/>
+              <a:cs typeface="Times New Roman" pitchFamily="18" charset="0"/>
+            </a:endParaRPr>
+          </a:p>
+        </p:txBody>
+      </p:sp>
+      <p:sp>
+        <p:nvSpPr>
+          <p:cNvPr id="33" name="Rectangle 32"/>
+          <p:cNvSpPr/>
+          <p:nvPr/>
+        </p:nvSpPr>
+        <p:spPr>
+          <a:xfrm>
+            <a:off x="2667000" y="1524000"/>
+            <a:ext cx="2090637" cy="292388"/>
+          </a:xfrm>
+          <a:prstGeom prst="rect">
+            <a:avLst/>
+          </a:prstGeom>
+        </p:spPr>
+        <p:txBody>
+          <a:bodyPr wrap="none">
+            <a:spAutoFit/>
+          </a:bodyPr>
+          <a:lstStyle/>
+          <a:p>
+            <a:pPr algn="ctr"/>
+            <a:r>
+              <a:rPr lang="en-US" sz="1300" b="1" dirty="0" err="1" smtClean="0">
+                <a:latin typeface="Times New Roman" pitchFamily="18" charset="0"/>
+                <a:cs typeface="Times New Roman" pitchFamily="18" charset="0"/>
+              </a:rPr>
+              <a:t>Bài</a:t>
+            </a:r>
+            <a:r>
+              <a:rPr lang="en-US" sz="1300" b="1" dirty="0" smtClean="0">
+                <a:latin typeface="Times New Roman" pitchFamily="18" charset="0"/>
+                <a:cs typeface="Times New Roman" pitchFamily="18" charset="0"/>
+              </a:rPr>
+              <a:t> </a:t>
+            </a:r>
+            <a:r>
+              <a:rPr lang="en-US" sz="1300" b="1" dirty="0" err="1" smtClean="0">
+                <a:latin typeface="Times New Roman" pitchFamily="18" charset="0"/>
+                <a:cs typeface="Times New Roman" pitchFamily="18" charset="0"/>
+              </a:rPr>
+              <a:t>báo</a:t>
+            </a:r>
+            <a:r>
+              <a:rPr lang="en-US" sz="1300" b="1" dirty="0" smtClean="0">
+                <a:latin typeface="Times New Roman" pitchFamily="18" charset="0"/>
+                <a:cs typeface="Times New Roman" pitchFamily="18" charset="0"/>
+              </a:rPr>
+              <a:t> </a:t>
+            </a:r>
+            <a:r>
+              <a:rPr lang="en-US" sz="1300" b="1" dirty="0" err="1" smtClean="0">
+                <a:latin typeface="Times New Roman" pitchFamily="18" charset="0"/>
+                <a:cs typeface="Times New Roman" pitchFamily="18" charset="0"/>
+              </a:rPr>
+              <a:t>khoa</a:t>
+            </a:r>
+            <a:r>
+              <a:rPr lang="en-US" sz="1300" b="1" dirty="0" smtClean="0">
+                <a:latin typeface="Times New Roman" pitchFamily="18" charset="0"/>
+                <a:cs typeface="Times New Roman" pitchFamily="18" charset="0"/>
+              </a:rPr>
+              <a:t> </a:t>
+            </a:r>
+            <a:r>
+              <a:rPr lang="en-US" sz="1300" b="1" dirty="0" err="1" smtClean="0">
+                <a:latin typeface="Times New Roman" pitchFamily="18" charset="0"/>
+                <a:cs typeface="Times New Roman" pitchFamily="18" charset="0"/>
+              </a:rPr>
+              <a:t>học</a:t>
+            </a:r>
+            <a:r>
+              <a:rPr lang="en-US" sz="1300" b="1" dirty="0" smtClean="0">
+                <a:latin typeface="Times New Roman" pitchFamily="18" charset="0"/>
+                <a:cs typeface="Times New Roman" pitchFamily="18" charset="0"/>
+              </a:rPr>
+              <a:t> </a:t>
+            </a:r>
+            <a:r>
+              <a:rPr lang="en-US" sz="1300" b="1" dirty="0" err="1" smtClean="0">
+                <a:latin typeface="Times New Roman" pitchFamily="18" charset="0"/>
+                <a:cs typeface="Times New Roman" pitchFamily="18" charset="0"/>
+              </a:rPr>
+              <a:t>máy</a:t>
+            </a:r>
+            <a:r>
+              <a:rPr lang="en-US" sz="1300" b="1" dirty="0" smtClean="0">
+                <a:latin typeface="Times New Roman" pitchFamily="18" charset="0"/>
+                <a:cs typeface="Times New Roman" pitchFamily="18" charset="0"/>
+              </a:rPr>
+              <a:t> </a:t>
+            </a:r>
+            <a:r>
+              <a:rPr lang="en-US" sz="1300" b="1" dirty="0" err="1" smtClean="0">
+                <a:latin typeface="Times New Roman" pitchFamily="18" charset="0"/>
+                <a:cs typeface="Times New Roman" pitchFamily="18" charset="0"/>
+              </a:rPr>
+              <a:t>tính</a:t>
+            </a:r>
+            <a:endParaRPr lang="en-US" sz="1300" b="1" dirty="0" smtClean="0">
+              <a:latin typeface="Times New Roman" pitchFamily="18" charset="0"/>
+              <a:cs typeface="Times New Roman" pitchFamily="18" charset="0"/>
+            </a:endParaRPr>
+          </a:p>
+        </p:txBody>
+      </p:sp>
+      <p:sp>
+        <p:nvSpPr>
+          <p:cNvPr id="35" name="Flowchart: Document 34"/>
+          <p:cNvSpPr/>
+          <p:nvPr/>
+        </p:nvSpPr>
+        <p:spPr>
+          <a:xfrm>
+            <a:off x="3276600" y="2133600"/>
+            <a:ext cx="1371600" cy="1905000"/>
+          </a:xfrm>
+          <a:prstGeom prst="flowChartDocument">
+            <a:avLst/>
+          </a:prstGeom>
+          <a:solidFill>
+            <a:schemeClr val="accent1"/>
+          </a:solidFill>
+        </p:spPr>
+        <p:style>
+          <a:lnRef idx="2">
+            <a:schemeClr val="accent1">
+              <a:shade val="50000"/>
+            </a:schemeClr>
+          </a:lnRef>
+          <a:fillRef idx="1">
+            <a:schemeClr val="accent1"/>
+          </a:fillRef>
+          <a:effectRef idx="0">
+            <a:schemeClr val="accent1"/>
+          </a:effectRef>
+          <a:fontRef idx="minor">
+            <a:schemeClr val="lt1"/>
+          </a:fontRef>
+        </p:style>
+        <p:txBody>
+          <a:bodyPr rtlCol="0" anchor="ctr"/>
+          <a:lstStyle/>
+          <a:p>
+            <a:pPr algn="ctr"/>
+            <a:r>
+              <a:rPr lang="en-US" sz="1300" b="1" dirty="0" smtClean="0">
+                <a:solidFill>
+                  <a:schemeClr val="tx1"/>
+                </a:solidFill>
+                <a:latin typeface="Times New Roman" pitchFamily="18" charset="0"/>
+                <a:cs typeface="Times New Roman" pitchFamily="18" charset="0"/>
+              </a:rPr>
+              <a:t>Metadata</a:t>
+            </a:r>
+          </a:p>
+        </p:txBody>
+      </p:sp>
+      <p:sp>
+        <p:nvSpPr>
+          <p:cNvPr id="40" name="Rectangle 39"/>
+          <p:cNvSpPr/>
+          <p:nvPr/>
+        </p:nvSpPr>
+        <p:spPr>
+          <a:xfrm>
+            <a:off x="5562600" y="1676400"/>
+            <a:ext cx="1752600" cy="4572000"/>
+          </a:xfrm>
+          <a:prstGeom prst="rect">
+            <a:avLst/>
+          </a:prstGeom>
+          <a:noFill/>
+          <a:ln>
+            <a:prstDash val="lgDash"/>
+          </a:ln>
+        </p:spPr>
+        <p:style>
+          <a:lnRef idx="2">
+            <a:schemeClr val="accent1">
+              <a:shade val="50000"/>
+            </a:schemeClr>
+          </a:lnRef>
+          <a:fillRef idx="1">
+            <a:schemeClr val="accent1"/>
+          </a:fillRef>
+          <a:effectRef idx="0">
+            <a:schemeClr val="accent1"/>
+          </a:effectRef>
+          <a:fontRef idx="minor">
+            <a:schemeClr val="lt1"/>
+          </a:fontRef>
+        </p:style>
+        <p:txBody>
+          <a:bodyPr rtlCol="0" anchor="ctr"/>
+          <a:lstStyle/>
+          <a:p>
+            <a:pPr algn="ctr"/>
+            <a:r>
+              <a:rPr lang="en-US" sz="1300" b="1" dirty="0" err="1" smtClean="0">
+                <a:solidFill>
+                  <a:schemeClr val="tx1"/>
+                </a:solidFill>
+                <a:latin typeface="Times New Roman" pitchFamily="18" charset="0"/>
+                <a:cs typeface="Times New Roman" pitchFamily="18" charset="0"/>
+              </a:rPr>
+              <a:t>Tác</a:t>
+            </a:r>
+            <a:r>
+              <a:rPr lang="en-US" sz="1300" b="1" dirty="0" smtClean="0">
+                <a:solidFill>
+                  <a:schemeClr val="tx1"/>
+                </a:solidFill>
+                <a:latin typeface="Times New Roman" pitchFamily="18" charset="0"/>
+                <a:cs typeface="Times New Roman" pitchFamily="18" charset="0"/>
+              </a:rPr>
+              <a:t> </a:t>
+            </a:r>
+            <a:r>
+              <a:rPr lang="en-US" sz="1300" b="1" dirty="0" err="1" smtClean="0">
+                <a:solidFill>
+                  <a:schemeClr val="tx1"/>
+                </a:solidFill>
+                <a:latin typeface="Times New Roman" pitchFamily="18" charset="0"/>
+                <a:cs typeface="Times New Roman" pitchFamily="18" charset="0"/>
+              </a:rPr>
+              <a:t>giả</a:t>
+            </a:r>
+            <a:endParaRPr lang="en-US" sz="1300" b="1" dirty="0" smtClean="0">
+              <a:solidFill>
+                <a:schemeClr val="tx1"/>
+              </a:solidFill>
+              <a:latin typeface="Times New Roman" pitchFamily="18" charset="0"/>
+              <a:cs typeface="Times New Roman" pitchFamily="18" charset="0"/>
+            </a:endParaRPr>
+          </a:p>
+          <a:p>
+            <a:pPr algn="ctr"/>
+            <a:endParaRPr lang="en-US" sz="1300" b="1" dirty="0" smtClean="0">
+              <a:solidFill>
+                <a:schemeClr val="tx1"/>
+              </a:solidFill>
+              <a:latin typeface="Times New Roman" pitchFamily="18" charset="0"/>
+              <a:cs typeface="Times New Roman" pitchFamily="18" charset="0"/>
+            </a:endParaRPr>
+          </a:p>
+          <a:p>
+            <a:pPr algn="ctr"/>
+            <a:endParaRPr lang="en-US" sz="1300" b="1" dirty="0" smtClean="0">
+              <a:solidFill>
+                <a:schemeClr val="tx1"/>
+              </a:solidFill>
+              <a:latin typeface="Times New Roman" pitchFamily="18" charset="0"/>
+              <a:cs typeface="Times New Roman" pitchFamily="18" charset="0"/>
+            </a:endParaRPr>
+          </a:p>
+          <a:p>
+            <a:pPr algn="ctr"/>
+            <a:r>
+              <a:rPr lang="en-US" sz="1300" b="1" dirty="0" err="1" smtClean="0">
+                <a:solidFill>
+                  <a:schemeClr val="tx1"/>
+                </a:solidFill>
+                <a:latin typeface="Times New Roman" pitchFamily="18" charset="0"/>
+                <a:cs typeface="Times New Roman" pitchFamily="18" charset="0"/>
+              </a:rPr>
+              <a:t>Hội</a:t>
+            </a:r>
+            <a:r>
+              <a:rPr lang="en-US" sz="1300" b="1" dirty="0" smtClean="0">
+                <a:solidFill>
+                  <a:schemeClr val="tx1"/>
+                </a:solidFill>
+                <a:latin typeface="Times New Roman" pitchFamily="18" charset="0"/>
+                <a:cs typeface="Times New Roman" pitchFamily="18" charset="0"/>
+              </a:rPr>
+              <a:t> </a:t>
+            </a:r>
+            <a:r>
+              <a:rPr lang="en-US" sz="1300" b="1" dirty="0" err="1" smtClean="0">
+                <a:solidFill>
+                  <a:schemeClr val="tx1"/>
+                </a:solidFill>
+                <a:latin typeface="Times New Roman" pitchFamily="18" charset="0"/>
+                <a:cs typeface="Times New Roman" pitchFamily="18" charset="0"/>
+              </a:rPr>
+              <a:t>nghị</a:t>
+            </a:r>
+            <a:endParaRPr lang="en-US" sz="1300" b="1" dirty="0" smtClean="0">
+              <a:solidFill>
+                <a:schemeClr val="tx1"/>
+              </a:solidFill>
+              <a:latin typeface="Times New Roman" pitchFamily="18" charset="0"/>
+              <a:cs typeface="Times New Roman" pitchFamily="18" charset="0"/>
+            </a:endParaRPr>
+          </a:p>
+          <a:p>
+            <a:pPr algn="ctr"/>
+            <a:endParaRPr lang="en-US" sz="1300" b="1" dirty="0" smtClean="0">
+              <a:solidFill>
+                <a:schemeClr val="tx1"/>
+              </a:solidFill>
+              <a:latin typeface="Times New Roman" pitchFamily="18" charset="0"/>
+              <a:cs typeface="Times New Roman" pitchFamily="18" charset="0"/>
+            </a:endParaRPr>
+          </a:p>
+          <a:p>
+            <a:pPr algn="ctr"/>
+            <a:endParaRPr lang="en-US" sz="1300" b="1" dirty="0" smtClean="0">
+              <a:solidFill>
+                <a:schemeClr val="tx1"/>
+              </a:solidFill>
+              <a:latin typeface="Times New Roman" pitchFamily="18" charset="0"/>
+              <a:cs typeface="Times New Roman" pitchFamily="18" charset="0"/>
+            </a:endParaRPr>
+          </a:p>
+          <a:p>
+            <a:pPr algn="ctr"/>
+            <a:r>
+              <a:rPr lang="en-US" sz="1300" b="1" dirty="0" err="1" smtClean="0">
+                <a:solidFill>
+                  <a:schemeClr val="tx1"/>
+                </a:solidFill>
+                <a:latin typeface="Times New Roman" pitchFamily="18" charset="0"/>
+                <a:cs typeface="Times New Roman" pitchFamily="18" charset="0"/>
+              </a:rPr>
+              <a:t>Năm</a:t>
+            </a:r>
+            <a:endParaRPr lang="en-US" sz="1300" b="1" dirty="0" smtClean="0">
+              <a:solidFill>
+                <a:schemeClr val="tx1"/>
+              </a:solidFill>
+              <a:latin typeface="Times New Roman" pitchFamily="18" charset="0"/>
+              <a:cs typeface="Times New Roman" pitchFamily="18" charset="0"/>
+            </a:endParaRPr>
+          </a:p>
+          <a:p>
+            <a:pPr algn="ctr"/>
+            <a:endParaRPr lang="en-US" sz="1300" b="1" dirty="0" smtClean="0">
+              <a:solidFill>
+                <a:schemeClr val="tx1"/>
+              </a:solidFill>
+              <a:latin typeface="Times New Roman" pitchFamily="18" charset="0"/>
+              <a:cs typeface="Times New Roman" pitchFamily="18" charset="0"/>
+            </a:endParaRPr>
+          </a:p>
+          <a:p>
+            <a:pPr algn="ctr"/>
+            <a:endParaRPr lang="en-US" sz="1300" b="1" dirty="0" smtClean="0">
+              <a:solidFill>
+                <a:schemeClr val="tx1"/>
+              </a:solidFill>
+              <a:latin typeface="Times New Roman" pitchFamily="18" charset="0"/>
+              <a:cs typeface="Times New Roman" pitchFamily="18" charset="0"/>
+            </a:endParaRPr>
+          </a:p>
+          <a:p>
+            <a:pPr algn="ctr"/>
+            <a:endParaRPr lang="en-US" sz="1300" b="1" dirty="0" smtClean="0">
+              <a:solidFill>
+                <a:schemeClr val="tx1"/>
+              </a:solidFill>
+              <a:latin typeface="Times New Roman" pitchFamily="18" charset="0"/>
+              <a:cs typeface="Times New Roman" pitchFamily="18" charset="0"/>
+            </a:endParaRPr>
+          </a:p>
+          <a:p>
+            <a:pPr algn="ctr"/>
+            <a:endParaRPr lang="en-US" sz="1300" b="1" dirty="0" smtClean="0">
+              <a:solidFill>
+                <a:schemeClr val="tx1"/>
+              </a:solidFill>
+              <a:latin typeface="Times New Roman" pitchFamily="18" charset="0"/>
+              <a:cs typeface="Times New Roman" pitchFamily="18" charset="0"/>
+            </a:endParaRPr>
+          </a:p>
+          <a:p>
+            <a:pPr algn="ctr"/>
+            <a:r>
+              <a:rPr lang="en-US" sz="1300" b="1" dirty="0" smtClean="0">
+                <a:solidFill>
+                  <a:schemeClr val="tx1"/>
+                </a:solidFill>
+                <a:latin typeface="Times New Roman" pitchFamily="18" charset="0"/>
+                <a:cs typeface="Times New Roman" pitchFamily="18" charset="0"/>
+              </a:rPr>
+              <a:t>Reference</a:t>
+            </a:r>
+          </a:p>
+          <a:p>
+            <a:pPr algn="ctr"/>
+            <a:endParaRPr lang="en-US" sz="1300" b="1" dirty="0" smtClean="0">
+              <a:solidFill>
+                <a:schemeClr val="tx1"/>
+              </a:solidFill>
+              <a:latin typeface="Times New Roman" pitchFamily="18" charset="0"/>
+              <a:cs typeface="Times New Roman" pitchFamily="18" charset="0"/>
+            </a:endParaRPr>
+          </a:p>
+          <a:p>
+            <a:pPr algn="ctr"/>
+            <a:r>
+              <a:rPr lang="en-US" sz="1300" b="1" dirty="0" smtClean="0">
+                <a:solidFill>
+                  <a:schemeClr val="tx1"/>
+                </a:solidFill>
+                <a:latin typeface="Times New Roman" pitchFamily="18" charset="0"/>
+                <a:cs typeface="Times New Roman" pitchFamily="18" charset="0"/>
+              </a:rPr>
+              <a:t>Title</a:t>
+            </a:r>
+          </a:p>
+          <a:p>
+            <a:pPr algn="ctr"/>
+            <a:endParaRPr lang="en-US" sz="1300" b="1" dirty="0" smtClean="0">
+              <a:solidFill>
+                <a:schemeClr val="tx1"/>
+              </a:solidFill>
+              <a:latin typeface="Times New Roman" pitchFamily="18" charset="0"/>
+              <a:cs typeface="Times New Roman" pitchFamily="18" charset="0"/>
+            </a:endParaRPr>
+          </a:p>
+          <a:p>
+            <a:pPr algn="ctr"/>
+            <a:endParaRPr lang="en-US" sz="1300" b="1" dirty="0" smtClean="0">
+              <a:solidFill>
+                <a:schemeClr val="tx1"/>
+              </a:solidFill>
+              <a:latin typeface="Times New Roman" pitchFamily="18" charset="0"/>
+              <a:cs typeface="Times New Roman" pitchFamily="18" charset="0"/>
+            </a:endParaRPr>
+          </a:p>
+          <a:p>
+            <a:pPr algn="ctr"/>
+            <a:endParaRPr lang="en-US" sz="1300" b="1" dirty="0" smtClean="0">
+              <a:solidFill>
+                <a:schemeClr val="tx1"/>
+              </a:solidFill>
+              <a:latin typeface="Times New Roman" pitchFamily="18" charset="0"/>
+              <a:cs typeface="Times New Roman" pitchFamily="18" charset="0"/>
+            </a:endParaRPr>
+          </a:p>
+          <a:p>
+            <a:pPr algn="ctr"/>
+            <a:endParaRPr lang="en-US" sz="1300" b="1" dirty="0" smtClean="0">
+              <a:solidFill>
+                <a:schemeClr val="tx1"/>
+              </a:solidFill>
+              <a:latin typeface="Times New Roman" pitchFamily="18" charset="0"/>
+              <a:cs typeface="Times New Roman" pitchFamily="18" charset="0"/>
+            </a:endParaRPr>
+          </a:p>
+          <a:p>
+            <a:pPr algn="ctr"/>
+            <a:endParaRPr lang="en-US" sz="1300" b="1" dirty="0">
+              <a:solidFill>
+                <a:schemeClr val="tx1"/>
+              </a:solidFill>
+              <a:latin typeface="Times New Roman" pitchFamily="18" charset="0"/>
+              <a:cs typeface="Times New Roman" pitchFamily="18" charset="0"/>
+            </a:endParaRPr>
+          </a:p>
+        </p:txBody>
+      </p:sp>
+      <p:cxnSp>
+        <p:nvCxnSpPr>
+          <p:cNvPr id="41" name="Straight Arrow Connector 40"/>
+          <p:cNvCxnSpPr/>
+          <p:nvPr/>
+        </p:nvCxnSpPr>
+        <p:spPr>
+          <a:xfrm flipV="1">
+            <a:off x="4419600" y="2209800"/>
+            <a:ext cx="1676400" cy="685800"/>
+          </a:xfrm>
+          <a:prstGeom prst="straightConnector1">
+            <a:avLst/>
+          </a:prstGeom>
+          <a:ln>
+            <a:solidFill>
+              <a:srgbClr val="FF0000"/>
+            </a:solidFill>
+            <a:tailEnd type="arrow"/>
+          </a:ln>
+        </p:spPr>
+        <p:style>
+          <a:lnRef idx="1">
+            <a:schemeClr val="accent1"/>
+          </a:lnRef>
+          <a:fillRef idx="0">
+            <a:schemeClr val="accent1"/>
+          </a:fillRef>
+          <a:effectRef idx="0">
+            <a:schemeClr val="accent1"/>
+          </a:effectRef>
+          <a:fontRef idx="minor">
+            <a:schemeClr val="tx1"/>
+          </a:fontRef>
+        </p:style>
+      </p:cxnSp>
+      <p:cxnSp>
+        <p:nvCxnSpPr>
+          <p:cNvPr id="42" name="Straight Arrow Connector 41"/>
+          <p:cNvCxnSpPr/>
+          <p:nvPr/>
+        </p:nvCxnSpPr>
+        <p:spPr>
+          <a:xfrm flipV="1">
+            <a:off x="4419600" y="2743200"/>
+            <a:ext cx="1600200" cy="152400"/>
+          </a:xfrm>
+          <a:prstGeom prst="straightConnector1">
+            <a:avLst/>
+          </a:prstGeom>
+          <a:ln>
+            <a:solidFill>
+              <a:srgbClr val="FF0000"/>
+            </a:solidFill>
+            <a:tailEnd type="arrow"/>
+          </a:ln>
+        </p:spPr>
+        <p:style>
+          <a:lnRef idx="1">
+            <a:schemeClr val="accent1"/>
+          </a:lnRef>
+          <a:fillRef idx="0">
+            <a:schemeClr val="accent1"/>
+          </a:fillRef>
+          <a:effectRef idx="0">
+            <a:schemeClr val="accent1"/>
+          </a:effectRef>
+          <a:fontRef idx="minor">
+            <a:schemeClr val="tx1"/>
+          </a:fontRef>
+        </p:style>
+      </p:cxnSp>
+      <p:cxnSp>
+        <p:nvCxnSpPr>
+          <p:cNvPr id="44" name="Straight Arrow Connector 43"/>
+          <p:cNvCxnSpPr/>
+          <p:nvPr/>
+        </p:nvCxnSpPr>
+        <p:spPr>
+          <a:xfrm>
+            <a:off x="4343400" y="2971800"/>
+            <a:ext cx="1752600" cy="381000"/>
+          </a:xfrm>
+          <a:prstGeom prst="straightConnector1">
+            <a:avLst/>
+          </a:prstGeom>
+          <a:ln>
+            <a:solidFill>
+              <a:srgbClr val="FF0000"/>
+            </a:solidFill>
+            <a:tailEnd type="arrow"/>
+          </a:ln>
+        </p:spPr>
+        <p:style>
+          <a:lnRef idx="1">
+            <a:schemeClr val="accent1"/>
+          </a:lnRef>
+          <a:fillRef idx="0">
+            <a:schemeClr val="accent1"/>
+          </a:fillRef>
+          <a:effectRef idx="0">
+            <a:schemeClr val="accent1"/>
+          </a:effectRef>
+          <a:fontRef idx="minor">
+            <a:schemeClr val="tx1"/>
+          </a:fontRef>
+        </p:style>
+      </p:cxnSp>
+      <p:cxnSp>
+        <p:nvCxnSpPr>
+          <p:cNvPr id="46" name="Straight Arrow Connector 45"/>
+          <p:cNvCxnSpPr/>
+          <p:nvPr/>
+        </p:nvCxnSpPr>
+        <p:spPr>
+          <a:xfrm>
+            <a:off x="4419600" y="3048000"/>
+            <a:ext cx="1447800" cy="1295400"/>
+          </a:xfrm>
+          <a:prstGeom prst="straightConnector1">
+            <a:avLst/>
+          </a:prstGeom>
+          <a:ln>
+            <a:solidFill>
+              <a:srgbClr val="FF0000"/>
+            </a:solidFill>
+            <a:tailEnd type="arrow"/>
+          </a:ln>
+        </p:spPr>
+        <p:style>
+          <a:lnRef idx="1">
+            <a:schemeClr val="accent1"/>
+          </a:lnRef>
+          <a:fillRef idx="0">
+            <a:schemeClr val="accent1"/>
+          </a:fillRef>
+          <a:effectRef idx="0">
+            <a:schemeClr val="accent1"/>
+          </a:effectRef>
+          <a:fontRef idx="minor">
+            <a:schemeClr val="tx1"/>
+          </a:fontRef>
+        </p:style>
+      </p:cxnSp>
+      <p:cxnSp>
+        <p:nvCxnSpPr>
+          <p:cNvPr id="47" name="Straight Arrow Connector 46"/>
+          <p:cNvCxnSpPr/>
+          <p:nvPr/>
+        </p:nvCxnSpPr>
+        <p:spPr>
+          <a:xfrm rot="16200000" flipH="1">
+            <a:off x="4229100" y="3162300"/>
+            <a:ext cx="1752600" cy="1676400"/>
+          </a:xfrm>
+          <a:prstGeom prst="straightConnector1">
+            <a:avLst/>
+          </a:prstGeom>
+          <a:ln>
+            <a:solidFill>
+              <a:srgbClr val="FF0000"/>
+            </a:solidFill>
+            <a:tailEnd type="arrow"/>
+          </a:ln>
+        </p:spPr>
+        <p:style>
+          <a:lnRef idx="1">
+            <a:schemeClr val="accent1"/>
+          </a:lnRef>
+          <a:fillRef idx="0">
+            <a:schemeClr val="accent1"/>
+          </a:fillRef>
+          <a:effectRef idx="0">
+            <a:schemeClr val="accent1"/>
+          </a:effectRef>
+          <a:fontRef idx="minor">
+            <a:schemeClr val="tx1"/>
+          </a:fontRef>
+        </p:style>
+      </p:cxnSp>
+      <p:sp>
+        <p:nvSpPr>
+          <p:cNvPr id="48" name="Rectangle 47"/>
+          <p:cNvSpPr/>
+          <p:nvPr/>
+        </p:nvSpPr>
+        <p:spPr>
+          <a:xfrm>
+            <a:off x="5453163" y="1295400"/>
+            <a:ext cx="1879232" cy="292388"/>
+          </a:xfrm>
+          <a:prstGeom prst="rect">
+            <a:avLst/>
+          </a:prstGeom>
+        </p:spPr>
+        <p:txBody>
+          <a:bodyPr wrap="none">
+            <a:spAutoFit/>
+          </a:bodyPr>
+          <a:lstStyle/>
+          <a:p>
+            <a:pPr algn="ctr"/>
+            <a:r>
+              <a:rPr lang="en-US" sz="1300" b="1" dirty="0" err="1" smtClean="0">
+                <a:latin typeface="Times New Roman" pitchFamily="18" charset="0"/>
+                <a:cs typeface="Times New Roman" pitchFamily="18" charset="0"/>
+              </a:rPr>
+              <a:t>Thông</a:t>
+            </a:r>
+            <a:r>
+              <a:rPr lang="en-US" sz="1300" b="1" dirty="0" smtClean="0">
+                <a:latin typeface="Times New Roman" pitchFamily="18" charset="0"/>
+                <a:cs typeface="Times New Roman" pitchFamily="18" charset="0"/>
+              </a:rPr>
+              <a:t> tin </a:t>
+            </a:r>
+            <a:r>
+              <a:rPr lang="en-US" sz="1300" b="1" dirty="0" err="1" smtClean="0">
+                <a:latin typeface="Times New Roman" pitchFamily="18" charset="0"/>
+                <a:cs typeface="Times New Roman" pitchFamily="18" charset="0"/>
+              </a:rPr>
+              <a:t>trong</a:t>
+            </a:r>
+            <a:r>
+              <a:rPr lang="en-US" sz="1300" b="1" dirty="0" smtClean="0">
+                <a:latin typeface="Times New Roman" pitchFamily="18" charset="0"/>
+                <a:cs typeface="Times New Roman" pitchFamily="18" charset="0"/>
+              </a:rPr>
+              <a:t> </a:t>
+            </a:r>
+            <a:r>
+              <a:rPr lang="en-US" sz="1300" b="1" dirty="0" err="1" smtClean="0">
+                <a:latin typeface="Times New Roman" pitchFamily="18" charset="0"/>
+                <a:cs typeface="Times New Roman" pitchFamily="18" charset="0"/>
+              </a:rPr>
+              <a:t>bài</a:t>
+            </a:r>
+            <a:r>
+              <a:rPr lang="en-US" sz="1300" b="1" dirty="0" smtClean="0">
+                <a:latin typeface="Times New Roman" pitchFamily="18" charset="0"/>
+                <a:cs typeface="Times New Roman" pitchFamily="18" charset="0"/>
+              </a:rPr>
+              <a:t> </a:t>
+            </a:r>
+            <a:r>
+              <a:rPr lang="en-US" sz="1300" b="1" dirty="0" err="1" smtClean="0">
+                <a:latin typeface="Times New Roman" pitchFamily="18" charset="0"/>
+                <a:cs typeface="Times New Roman" pitchFamily="18" charset="0"/>
+              </a:rPr>
+              <a:t>báo</a:t>
+            </a:r>
+            <a:endParaRPr lang="en-US" sz="1300" b="1" dirty="0" smtClean="0">
+              <a:latin typeface="Times New Roman" pitchFamily="18" charset="0"/>
+              <a:cs typeface="Times New Roman" pitchFamily="18" charset="0"/>
+            </a:endParaRPr>
+          </a:p>
+        </p:txBody>
+      </p:sp>
+      <p:sp>
+        <p:nvSpPr>
+          <p:cNvPr id="49" name="Right Arrow 48"/>
+          <p:cNvSpPr/>
+          <p:nvPr/>
+        </p:nvSpPr>
+        <p:spPr>
+          <a:xfrm>
+            <a:off x="1524000" y="2895600"/>
+            <a:ext cx="1447800" cy="152400"/>
+          </a:xfrm>
+          <a:prstGeom prst="rightArrow">
+            <a:avLst/>
+          </a:prstGeom>
+        </p:spPr>
+        <p:style>
+          <a:lnRef idx="2">
+            <a:schemeClr val="accent1">
+              <a:shade val="50000"/>
+            </a:schemeClr>
+          </a:lnRef>
+          <a:fillRef idx="1">
+            <a:schemeClr val="accent1"/>
+          </a:fillRef>
+          <a:effectRef idx="0">
+            <a:schemeClr val="accent1"/>
+          </a:effectRef>
+          <a:fontRef idx="minor">
+            <a:schemeClr val="lt1"/>
+          </a:fontRef>
+        </p:style>
+        <p:txBody>
+          <a:bodyPr rtlCol="0" anchor="ctr"/>
+          <a:lstStyle/>
+          <a:p>
+            <a:pPr algn="ctr"/>
+            <a:endParaRPr lang="en-US"/>
+          </a:p>
+        </p:txBody>
+      </p:sp>
+      <p:sp>
+        <p:nvSpPr>
+          <p:cNvPr id="53" name="TextBox 52"/>
+          <p:cNvSpPr txBox="1"/>
+          <p:nvPr/>
+        </p:nvSpPr>
+        <p:spPr>
+          <a:xfrm>
+            <a:off x="1752600" y="2514600"/>
+            <a:ext cx="685800" cy="369332"/>
+          </a:xfrm>
+          <a:prstGeom prst="rect">
+            <a:avLst/>
+          </a:prstGeom>
+          <a:noFill/>
+        </p:spPr>
+        <p:txBody>
+          <a:bodyPr wrap="square" rtlCol="0">
+            <a:spAutoFit/>
+          </a:bodyPr>
+          <a:lstStyle/>
+          <a:p>
+            <a:r>
+              <a:rPr lang="en-US" dirty="0" err="1" smtClean="0"/>
+              <a:t>Rút</a:t>
+            </a:r>
+            <a:endParaRPr lang="en-US" dirty="0"/>
+          </a:p>
+        </p:txBody>
+      </p:sp>
+      <p:sp>
+        <p:nvSpPr>
+          <p:cNvPr id="54" name="TextBox 53"/>
+          <p:cNvSpPr txBox="1"/>
+          <p:nvPr/>
+        </p:nvSpPr>
+        <p:spPr>
+          <a:xfrm>
+            <a:off x="2590800" y="6248400"/>
+            <a:ext cx="2771913" cy="369332"/>
+          </a:xfrm>
+          <a:prstGeom prst="rect">
+            <a:avLst/>
+          </a:prstGeom>
+          <a:noFill/>
+        </p:spPr>
+        <p:txBody>
+          <a:bodyPr wrap="none" rtlCol="0">
+            <a:spAutoFit/>
+          </a:bodyPr>
+          <a:lstStyle/>
+          <a:p>
+            <a:r>
+              <a:rPr lang="en-US" b="1" dirty="0" smtClean="0">
+                <a:latin typeface="Times New Roman" pitchFamily="18" charset="0"/>
+                <a:cs typeface="Times New Roman" pitchFamily="18" charset="0"/>
+              </a:rPr>
+              <a:t>(3) </a:t>
+            </a:r>
+            <a:r>
+              <a:rPr lang="en-US" b="1" dirty="0" smtClean="0">
+                <a:latin typeface="Times New Roman" pitchFamily="18" charset="0"/>
+                <a:cs typeface="Times New Roman" pitchFamily="18" charset="0"/>
+              </a:rPr>
+              <a:t>Module </a:t>
+            </a:r>
+            <a:r>
+              <a:rPr lang="en-US" b="1" dirty="0" smtClean="0">
+                <a:latin typeface="Times New Roman" pitchFamily="18" charset="0"/>
+                <a:cs typeface="Times New Roman" pitchFamily="18" charset="0"/>
+              </a:rPr>
+              <a:t>Import </a:t>
+            </a:r>
+            <a:r>
+              <a:rPr lang="en-US" b="1" dirty="0" err="1" smtClean="0">
+                <a:latin typeface="Times New Roman" pitchFamily="18" charset="0"/>
+                <a:cs typeface="Times New Roman" pitchFamily="18" charset="0"/>
+              </a:rPr>
+              <a:t>dữ</a:t>
+            </a:r>
+            <a:r>
+              <a:rPr lang="en-US" b="1" dirty="0" smtClean="0">
+                <a:latin typeface="Times New Roman" pitchFamily="18" charset="0"/>
+                <a:cs typeface="Times New Roman" pitchFamily="18" charset="0"/>
+              </a:rPr>
+              <a:t> </a:t>
+            </a:r>
+            <a:r>
+              <a:rPr lang="en-US" b="1" dirty="0" err="1" smtClean="0">
+                <a:latin typeface="Times New Roman" pitchFamily="18" charset="0"/>
+                <a:cs typeface="Times New Roman" pitchFamily="18" charset="0"/>
+              </a:rPr>
+              <a:t>liệu</a:t>
+            </a:r>
+            <a:endParaRPr lang="en-US" b="1" dirty="0">
               <a:latin typeface="Times New Roman" pitchFamily="18" charset="0"/>
               <a:cs typeface="Times New Roman" pitchFamily="18" charset="0"/>
             </a:endParaRPr>

</xml_diff>

<commit_message>
Bao cao, de cuong 31/8
</commit_message>
<xml_diff>
--- a/Outline thesis/De cuong/Kientrucdetai_26_8.pptx
+++ b/Outline thesis/De cuong/Kientrucdetai_26_8.pptx
@@ -4295,8 +4295,8 @@
         </p:nvSpPr>
         <p:spPr>
           <a:xfrm>
-            <a:off x="0" y="4038600"/>
-            <a:ext cx="1524000" cy="1828800"/>
+            <a:off x="0" y="3962400"/>
+            <a:ext cx="1524000" cy="1524000"/>
           </a:xfrm>
           <a:prstGeom prst="flowChartMagneticDisk">
             <a:avLst/>
@@ -4419,7 +4419,7 @@
         </p:nvSpPr>
         <p:spPr>
           <a:xfrm>
-            <a:off x="1600200" y="3962400"/>
+            <a:off x="1752600" y="3962400"/>
             <a:ext cx="1143000" cy="369332"/>
           </a:xfrm>
           <a:prstGeom prst="rect">
@@ -4468,80 +4468,10 @@
               <a:t>Title, </a:t>
             </a:r>
             <a:r>
-              <a:rPr lang="en-US" sz="1600" dirty="0" err="1" smtClean="0"/>
-              <a:t>Abtrach</a:t>
+              <a:rPr lang="en-US" sz="1600" dirty="0" smtClean="0"/>
+              <a:t>abstract</a:t>
             </a:r>
             <a:endParaRPr lang="en-US" sz="1600" dirty="0"/>
-          </a:p>
-        </p:txBody>
-      </p:sp>
-      <p:sp>
-        <p:nvSpPr>
-          <p:cNvPr id="35" name="Right Arrow 34"/>
-          <p:cNvSpPr/>
-          <p:nvPr/>
-        </p:nvSpPr>
-        <p:spPr>
-          <a:xfrm>
-            <a:off x="1524000" y="5029200"/>
-            <a:ext cx="3962400" cy="228600"/>
-          </a:xfrm>
-          <a:prstGeom prst="rightArrow">
-            <a:avLst/>
-          </a:prstGeom>
-        </p:spPr>
-        <p:style>
-          <a:lnRef idx="2">
-            <a:schemeClr val="accent1">
-              <a:shade val="50000"/>
-            </a:schemeClr>
-          </a:lnRef>
-          <a:fillRef idx="1">
-            <a:schemeClr val="accent1"/>
-          </a:fillRef>
-          <a:effectRef idx="0">
-            <a:schemeClr val="accent1"/>
-          </a:effectRef>
-          <a:fontRef idx="minor">
-            <a:schemeClr val="lt1"/>
-          </a:fontRef>
-        </p:style>
-        <p:txBody>
-          <a:bodyPr rtlCol="0" anchor="ctr"/>
-          <a:lstStyle/>
-          <a:p>
-            <a:pPr algn="ctr"/>
-            <a:endParaRPr lang="en-US"/>
-          </a:p>
-        </p:txBody>
-      </p:sp>
-      <p:sp>
-        <p:nvSpPr>
-          <p:cNvPr id="36" name="TextBox 35"/>
-          <p:cNvSpPr txBox="1"/>
-          <p:nvPr/>
-        </p:nvSpPr>
-        <p:spPr>
-          <a:xfrm>
-            <a:off x="1676400" y="4724400"/>
-            <a:ext cx="1600200" cy="369332"/>
-          </a:xfrm>
-          <a:prstGeom prst="rect">
-            <a:avLst/>
-          </a:prstGeom>
-          <a:noFill/>
-        </p:spPr>
-        <p:txBody>
-          <a:bodyPr wrap="square" rtlCol="0">
-            <a:spAutoFit/>
-          </a:bodyPr>
-          <a:lstStyle/>
-          <a:p>
-            <a:r>
-              <a:rPr lang="en-US" dirty="0" smtClean="0"/>
-              <a:t>Metadata</a:t>
-            </a:r>
-            <a:endParaRPr lang="en-US" dirty="0"/>
           </a:p>
         </p:txBody>
       </p:sp>
@@ -8188,8 +8118,8 @@
         </p:nvSpPr>
         <p:spPr>
           <a:xfrm>
-            <a:off x="1752600" y="2514600"/>
-            <a:ext cx="685800" cy="369332"/>
+            <a:off x="1600200" y="2590800"/>
+            <a:ext cx="1752600" cy="307777"/>
           </a:xfrm>
           <a:prstGeom prst="rect">
             <a:avLst/>
@@ -8203,10 +8133,22 @@
           <a:lstStyle/>
           <a:p>
             <a:r>
-              <a:rPr lang="en-US" dirty="0" err="1" smtClean="0"/>
-              <a:t>Rút</a:t>
-            </a:r>
-            <a:endParaRPr lang="en-US" dirty="0"/>
+              <a:rPr lang="en-US" sz="1400" dirty="0" err="1" smtClean="0"/>
+              <a:t>Lấy</a:t>
+            </a:r>
+            <a:r>
+              <a:rPr lang="en-US" sz="1400" dirty="0" smtClean="0"/>
+              <a:t> </a:t>
+            </a:r>
+            <a:r>
+              <a:rPr lang="en-US" sz="1400" dirty="0" err="1" smtClean="0"/>
+              <a:t>thông</a:t>
+            </a:r>
+            <a:r>
+              <a:rPr lang="en-US" sz="1400" dirty="0" smtClean="0"/>
+              <a:t> Tin</a:t>
+            </a:r>
+            <a:endParaRPr lang="en-US" sz="1400" dirty="0"/>
           </a:p>
         </p:txBody>
       </p:sp>
@@ -8237,21 +8179,7 @@
                 <a:latin typeface="Times New Roman" pitchFamily="18" charset="0"/>
                 <a:cs typeface="Times New Roman" pitchFamily="18" charset="0"/>
               </a:rPr>
-              <a:t>(3) </a:t>
-            </a:r>
-            <a:r>
-              <a:rPr lang="en-US" b="1" dirty="0" smtClean="0">
-                <a:latin typeface="Times New Roman" pitchFamily="18" charset="0"/>
-                <a:cs typeface="Times New Roman" pitchFamily="18" charset="0"/>
-              </a:rPr>
-              <a:t>Module </a:t>
-            </a:r>
-            <a:r>
-              <a:rPr lang="en-US" b="1" dirty="0" smtClean="0">
-                <a:latin typeface="Times New Roman" pitchFamily="18" charset="0"/>
-                <a:cs typeface="Times New Roman" pitchFamily="18" charset="0"/>
-              </a:rPr>
-              <a:t>Import </a:t>
+              <a:t>(3) Module Import </a:t>
             </a:r>
             <a:r>
               <a:rPr lang="en-US" b="1" dirty="0" err="1" smtClean="0">

</xml_diff>